<commit_message>
Dic Donnée + PPoint Présentation
</commit_message>
<xml_diff>
--- a/Docs/Présentation/IPP-Show.pptx
+++ b/Docs/Présentation/IPP-Show.pptx
@@ -13,8 +13,8 @@
   <p:sldIdLst>
     <p:sldId id="257" r:id="rId2"/>
     <p:sldId id="263" r:id="rId3"/>
-    <p:sldId id="258" r:id="rId4"/>
-    <p:sldId id="264" r:id="rId5"/>
+    <p:sldId id="264" r:id="rId4"/>
+    <p:sldId id="258" r:id="rId5"/>
     <p:sldId id="259" r:id="rId6"/>
     <p:sldId id="260" r:id="rId7"/>
     <p:sldId id="261" r:id="rId8"/>
@@ -224,7 +224,7 @@
             <a:pPr rtl="0"/>
             <a:fld id="{5D1B2D22-72A7-4D0C-BB92-D19B5D8E4BE1}" type="datetime1">
               <a:rPr lang="fr-FR" smtClean="0"/>
-              <a:t>12/10/2022</a:t>
+              <a:t>14/10/2022</a:t>
             </a:fld>
             <a:endParaRPr lang="fr-FR"/>
           </a:p>
@@ -406,7 +406,7 @@
             <a:pPr rtl="0"/>
             <a:fld id="{F41CEEFB-B3BF-4930-9532-AF4F216488D0}" type="datetime1">
               <a:rPr lang="fr-FR" noProof="0" smtClean="0"/>
-              <a:t>12/10/2022</a:t>
+              <a:t>14/10/2022</a:t>
             </a:fld>
             <a:endParaRPr lang="fr-FR" noProof="0"/>
           </a:p>
@@ -922,7 +922,7 @@
     </p:spTree>
     <p:extLst>
       <p:ext uri="{BB962C8B-B14F-4D97-AF65-F5344CB8AC3E}">
-        <p14:creationId xmlns:p14="http://schemas.microsoft.com/office/powerpoint/2010/main" val="1712464508"/>
+        <p14:creationId xmlns:p14="http://schemas.microsoft.com/office/powerpoint/2010/main" val="388253684"/>
       </p:ext>
     </p:extLst>
   </p:cSld>
@@ -1007,7 +1007,7 @@
     </p:spTree>
     <p:extLst>
       <p:ext uri="{BB962C8B-B14F-4D97-AF65-F5344CB8AC3E}">
-        <p14:creationId xmlns:p14="http://schemas.microsoft.com/office/powerpoint/2010/main" val="388253684"/>
+        <p14:creationId xmlns:p14="http://schemas.microsoft.com/office/powerpoint/2010/main" val="1712464508"/>
       </p:ext>
     </p:extLst>
   </p:cSld>
@@ -12480,8 +12480,8 @@
         </p:nvSpPr>
         <p:spPr>
           <a:xfrm>
-            <a:off x="712206" y="1979516"/>
-            <a:ext cx="10559357" cy="3954737"/>
+            <a:off x="1927634" y="2257574"/>
+            <a:ext cx="7805598" cy="2958182"/>
           </a:xfrm>
           <a:prstGeom prst="rect">
             <a:avLst/>
@@ -12494,7 +12494,7 @@
           </a:bodyPr>
           <a:lstStyle/>
           <a:p>
-            <a:pPr algn="just">
+            <a:pPr algn="ctr">
               <a:lnSpc>
                 <a:spcPct val="107000"/>
               </a:lnSpc>
@@ -12503,189 +12503,118 @@
               </a:spcAft>
             </a:pPr>
             <a:r>
-              <a:rPr lang="fr-CA" sz="1800" b="1" dirty="0">
+              <a:rPr lang="fr-CA" sz="4400" b="1" dirty="0">
                 <a:effectLst/>
                 <a:latin typeface="Calibri" panose="020F0502020204030204" pitchFamily="34" charset="0"/>
                 <a:ea typeface="Calibri" panose="020F0502020204030204" pitchFamily="34" charset="0"/>
                 <a:cs typeface="Times New Roman" panose="02020603050405020304" pitchFamily="18" charset="0"/>
               </a:rPr>
-              <a:t>Est une application mobile qui détermine un itinéraire.</a:t>
+              <a:t>L’application mobile qui établit les </a:t>
             </a:r>
-          </a:p>
-          <a:p>
-            <a:pPr algn="just">
-              <a:lnSpc>
-                <a:spcPct val="107000"/>
-              </a:lnSpc>
-              <a:spcAft>
-                <a:spcPts val="800"/>
-              </a:spcAft>
-            </a:pPr>
             <a:r>
-              <a:rPr lang="fr-CA" b="1" dirty="0">
+              <a:rPr lang="fr-CA" sz="4400" b="1" dirty="0">
+                <a:solidFill>
+                  <a:srgbClr val="FFFF00"/>
+                </a:solidFill>
                 <a:effectLst/>
                 <a:latin typeface="Calibri" panose="020F0502020204030204" pitchFamily="34" charset="0"/>
                 <a:ea typeface="Calibri" panose="020F0502020204030204" pitchFamily="34" charset="0"/>
                 <a:cs typeface="Times New Roman" panose="02020603050405020304" pitchFamily="18" charset="0"/>
               </a:rPr>
-              <a:t>Le trajet nouvellement calculé indiquera les étapes qui seront nécessaires pour compléter le parcours.</a:t>
+              <a:t>étapes</a:t>
             </a:r>
-            <a:endParaRPr lang="fr-CA" sz="1800" b="1" dirty="0">
-              <a:effectLst/>
-              <a:latin typeface="Calibri" panose="020F0502020204030204" pitchFamily="34" charset="0"/>
-              <a:ea typeface="Calibri" panose="020F0502020204030204" pitchFamily="34" charset="0"/>
-              <a:cs typeface="Times New Roman" panose="02020603050405020304" pitchFamily="18" charset="0"/>
-            </a:endParaRPr>
-          </a:p>
-          <a:p>
-            <a:pPr algn="just">
-              <a:lnSpc>
-                <a:spcPct val="107000"/>
-              </a:lnSpc>
-              <a:spcAft>
-                <a:spcPts val="800"/>
-              </a:spcAft>
-            </a:pPr>
             <a:r>
-              <a:rPr lang="fr-CA" sz="1800" b="1" dirty="0">
+              <a:rPr lang="fr-CA" sz="4400" b="1" dirty="0">
                 <a:effectLst/>
                 <a:latin typeface="Calibri" panose="020F0502020204030204" pitchFamily="34" charset="0"/>
                 <a:ea typeface="Calibri" panose="020F0502020204030204" pitchFamily="34" charset="0"/>
                 <a:cs typeface="Times New Roman" panose="02020603050405020304" pitchFamily="18" charset="0"/>
               </a:rPr>
-              <a:t>L’application communique avec un serveur central Firestore et s’authentifier à l’aide d’un code utilisateur.</a:t>
+              <a:t> d’un </a:t>
             </a:r>
-          </a:p>
-          <a:p>
-            <a:pPr algn="just">
-              <a:lnSpc>
-                <a:spcPct val="107000"/>
-              </a:lnSpc>
-              <a:spcAft>
-                <a:spcPts val="800"/>
-              </a:spcAft>
-            </a:pPr>
             <a:r>
-              <a:rPr lang="fr-CA" sz="1800" b="1" dirty="0">
+              <a:rPr lang="fr-CA" sz="4400" b="1" dirty="0">
+                <a:solidFill>
+                  <a:srgbClr val="FFFF00"/>
+                </a:solidFill>
                 <a:effectLst/>
                 <a:latin typeface="Calibri" panose="020F0502020204030204" pitchFamily="34" charset="0"/>
                 <a:ea typeface="Calibri" panose="020F0502020204030204" pitchFamily="34" charset="0"/>
                 <a:cs typeface="Times New Roman" panose="02020603050405020304" pitchFamily="18" charset="0"/>
               </a:rPr>
-              <a:t>Chaque profil utilisateur peut contenir une liste des destinations que l’utilisateur aura lui-même ajouté.</a:t>
+              <a:t>itinéraire</a:t>
             </a:r>
-          </a:p>
-          <a:p>
-            <a:pPr algn="just">
-              <a:lnSpc>
-                <a:spcPct val="107000"/>
-              </a:lnSpc>
-              <a:spcAft>
-                <a:spcPts val="800"/>
-              </a:spcAft>
-            </a:pPr>
             <a:r>
-              <a:rPr lang="fr-CA" sz="1800" b="1" dirty="0">
+              <a:rPr lang="fr-CA" sz="4400" b="1" dirty="0">
                 <a:effectLst/>
                 <a:latin typeface="Calibri" panose="020F0502020204030204" pitchFamily="34" charset="0"/>
                 <a:ea typeface="Calibri" panose="020F0502020204030204" pitchFamily="34" charset="0"/>
                 <a:cs typeface="Times New Roman" panose="02020603050405020304" pitchFamily="18" charset="0"/>
               </a:rPr>
-              <a:t>Les destinations comprennent un nom pour identification et une sous-liste d’étapes.  Chaque étape a une ou plusieurs activités.</a:t>
+              <a:t> pour une </a:t>
             </a:r>
-          </a:p>
-          <a:p>
-            <a:pPr algn="just">
-              <a:lnSpc>
-                <a:spcPct val="107000"/>
-              </a:lnSpc>
-              <a:spcAft>
-                <a:spcPts val="800"/>
-              </a:spcAft>
-            </a:pPr>
             <a:r>
-              <a:rPr lang="fr-CA" sz="1800" b="1" dirty="0">
+              <a:rPr lang="fr-CA" sz="4400" b="1" dirty="0">
+                <a:solidFill>
+                  <a:srgbClr val="FFFF00"/>
+                </a:solidFill>
                 <a:effectLst/>
                 <a:latin typeface="Calibri" panose="020F0502020204030204" pitchFamily="34" charset="0"/>
                 <a:ea typeface="Calibri" panose="020F0502020204030204" pitchFamily="34" charset="0"/>
                 <a:cs typeface="Times New Roman" panose="02020603050405020304" pitchFamily="18" charset="0"/>
               </a:rPr>
-              <a:t>Les activités :</a:t>
+              <a:t>meilleure</a:t>
             </a:r>
-          </a:p>
-          <a:p>
-            <a:pPr marL="342900" lvl="0" indent="-342900" algn="just">
-              <a:lnSpc>
-                <a:spcPct val="107000"/>
-              </a:lnSpc>
-              <a:buFont typeface="Symbol" panose="05050102010706020507" pitchFamily="18" charset="2"/>
-              <a:buChar char=""/>
-            </a:pPr>
             <a:r>
-              <a:rPr lang="fr-CA" sz="1800" b="1" dirty="0">
+              <a:rPr lang="fr-CA" sz="4400" b="1" dirty="0">
                 <a:effectLst/>
                 <a:latin typeface="Calibri" panose="020F0502020204030204" pitchFamily="34" charset="0"/>
                 <a:ea typeface="Calibri" panose="020F0502020204030204" pitchFamily="34" charset="0"/>
                 <a:cs typeface="Times New Roman" panose="02020603050405020304" pitchFamily="18" charset="0"/>
               </a:rPr>
-              <a:t>Plein d’essence,</a:t>
+              <a:t> </a:t>
             </a:r>
-          </a:p>
-          <a:p>
-            <a:pPr marL="342900" lvl="0" indent="-342900" algn="just">
-              <a:lnSpc>
-                <a:spcPct val="107000"/>
-              </a:lnSpc>
-              <a:buFont typeface="Symbol" panose="05050102010706020507" pitchFamily="18" charset="2"/>
-              <a:buChar char=""/>
-            </a:pPr>
             <a:r>
-              <a:rPr lang="fr-CA" sz="1800" b="1" dirty="0">
+              <a:rPr lang="fr-CA" sz="4400" b="1" dirty="0">
+                <a:solidFill>
+                  <a:srgbClr val="FFFF00"/>
+                </a:solidFill>
                 <a:effectLst/>
                 <a:latin typeface="Calibri" panose="020F0502020204030204" pitchFamily="34" charset="0"/>
                 <a:ea typeface="Calibri" panose="020F0502020204030204" pitchFamily="34" charset="0"/>
                 <a:cs typeface="Times New Roman" panose="02020603050405020304" pitchFamily="18" charset="0"/>
               </a:rPr>
-              <a:t>Recharge électrique,</a:t>
+              <a:t>planification</a:t>
             </a:r>
-          </a:p>
-          <a:p>
-            <a:pPr marL="342900" lvl="0" indent="-342900" algn="just">
-              <a:lnSpc>
-                <a:spcPct val="107000"/>
-              </a:lnSpc>
-              <a:buFont typeface="Symbol" panose="05050102010706020507" pitchFamily="18" charset="2"/>
-              <a:buChar char=""/>
-            </a:pPr>
             <a:r>
-              <a:rPr lang="fr-CA" sz="1800" b="1" dirty="0">
+              <a:rPr lang="fr-CA" sz="4400" b="1" dirty="0">
                 <a:effectLst/>
                 <a:latin typeface="Calibri" panose="020F0502020204030204" pitchFamily="34" charset="0"/>
                 <a:ea typeface="Calibri" panose="020F0502020204030204" pitchFamily="34" charset="0"/>
                 <a:cs typeface="Times New Roman" panose="02020603050405020304" pitchFamily="18" charset="0"/>
               </a:rPr>
-              <a:t>Manger et</a:t>
+              <a:t> de vos </a:t>
             </a:r>
-          </a:p>
-          <a:p>
-            <a:pPr marL="342900" lvl="0" indent="-342900" algn="just">
-              <a:lnSpc>
-                <a:spcPct val="107000"/>
-              </a:lnSpc>
-              <a:spcAft>
-                <a:spcPts val="800"/>
-              </a:spcAft>
-              <a:buFont typeface="Symbol" panose="05050102010706020507" pitchFamily="18" charset="2"/>
-              <a:buChar char=""/>
-            </a:pPr>
             <a:r>
-              <a:rPr lang="fr-CA" sz="1800" b="1" dirty="0">
+              <a:rPr lang="fr-CA" sz="4400" b="1" dirty="0">
+                <a:solidFill>
+                  <a:srgbClr val="FFFF00"/>
+                </a:solidFill>
                 <a:effectLst/>
                 <a:latin typeface="Calibri" panose="020F0502020204030204" pitchFamily="34" charset="0"/>
                 <a:ea typeface="Calibri" panose="020F0502020204030204" pitchFamily="34" charset="0"/>
                 <a:cs typeface="Times New Roman" panose="02020603050405020304" pitchFamily="18" charset="0"/>
               </a:rPr>
-              <a:t>Dormir.</a:t>
+              <a:t>voyages</a:t>
+            </a:r>
+            <a:r>
+              <a:rPr lang="fr-CA" sz="4400" b="1" dirty="0">
+                <a:effectLst/>
+                <a:latin typeface="Calibri" panose="020F0502020204030204" pitchFamily="34" charset="0"/>
+                <a:ea typeface="Calibri" panose="020F0502020204030204" pitchFamily="34" charset="0"/>
+                <a:cs typeface="Times New Roman" panose="02020603050405020304" pitchFamily="18" charset="0"/>
+              </a:rPr>
+              <a:t>.</a:t>
             </a:r>
           </a:p>
         </p:txBody>
@@ -12693,7 +12622,7 @@
     </p:spTree>
     <p:extLst>
       <p:ext uri="{BB962C8B-B14F-4D97-AF65-F5344CB8AC3E}">
-        <p14:creationId xmlns:p14="http://schemas.microsoft.com/office/powerpoint/2010/main" val="4230979803"/>
+        <p14:creationId xmlns:p14="http://schemas.microsoft.com/office/powerpoint/2010/main" val="1997239787"/>
       </p:ext>
     </p:extLst>
   </p:cSld>
@@ -12988,7 +12917,11 @@
           <a:p>
             <a:r>
               <a:rPr lang="fr-CA" sz="4000" dirty="0"/>
-              <a:t>LE PROJET</a:t>
+              <a:t>LE PROJET </a:t>
+            </a:r>
+            <a:r>
+              <a:rPr lang="fr-CA" sz="1400" dirty="0"/>
+              <a:t>(suite)</a:t>
             </a:r>
           </a:p>
         </p:txBody>
@@ -13007,7 +12940,7 @@
         </p:nvSpPr>
         <p:spPr>
           <a:xfrm>
-            <a:off x="543204" y="1236759"/>
+            <a:off x="543204" y="1250737"/>
             <a:ext cx="10936589" cy="4355245"/>
           </a:xfrm>
           <a:prstGeom prst="rect">
@@ -13127,8 +13060,8 @@
         </p:nvSpPr>
         <p:spPr>
           <a:xfrm>
-            <a:off x="712206" y="1979516"/>
-            <a:ext cx="10559357" cy="2062552"/>
+            <a:off x="992864" y="2503020"/>
+            <a:ext cx="10206272" cy="2161426"/>
           </a:xfrm>
           <a:prstGeom prst="rect">
             <a:avLst/>
@@ -13150,50 +13083,21 @@
               </a:spcAft>
             </a:pPr>
             <a:r>
-              <a:rPr lang="fr-CA" sz="1800" b="1" dirty="0">
+              <a:rPr lang="fr-CA" sz="2400" b="1" dirty="0">
+                <a:latin typeface="Calibri" panose="020F0502020204030204" pitchFamily="34" charset="0"/>
+                <a:ea typeface="Calibri" panose="020F0502020204030204" pitchFamily="34" charset="0"/>
+                <a:cs typeface="Times New Roman" panose="02020603050405020304" pitchFamily="18" charset="0"/>
+              </a:rPr>
+              <a:t>propose à chaque étape un ensemble d’activités</a:t>
+            </a:r>
+            <a:r>
+              <a:rPr lang="fr-CA" sz="2400" b="1" dirty="0">
                 <a:effectLst/>
                 <a:latin typeface="Calibri" panose="020F0502020204030204" pitchFamily="34" charset="0"/>
                 <a:ea typeface="Calibri" panose="020F0502020204030204" pitchFamily="34" charset="0"/>
                 <a:cs typeface="Times New Roman" panose="02020603050405020304" pitchFamily="18" charset="0"/>
               </a:rPr>
-              <a:t>L’application mobile qui établit les étapes d’un itinéraire pour une meilleure planification de vos voyages.</a:t>
-            </a:r>
-          </a:p>
-          <a:p>
-            <a:pPr algn="just">
-              <a:lnSpc>
-                <a:spcPct val="107000"/>
-              </a:lnSpc>
-              <a:spcAft>
-                <a:spcPts val="800"/>
-              </a:spcAft>
-            </a:pPr>
-            <a:r>
-              <a:rPr lang="fr-CA" b="1" dirty="0">
-                <a:effectLst/>
-                <a:latin typeface="Calibri" panose="020F0502020204030204" pitchFamily="34" charset="0"/>
-                <a:ea typeface="Calibri" panose="020F0502020204030204" pitchFamily="34" charset="0"/>
-                <a:cs typeface="Times New Roman" panose="02020603050405020304" pitchFamily="18" charset="0"/>
-              </a:rPr>
-              <a:t>Les activités des </a:t>
-            </a:r>
-            <a:r>
-              <a:rPr lang="fr-CA" b="1">
-                <a:effectLst/>
-                <a:latin typeface="Calibri" panose="020F0502020204030204" pitchFamily="34" charset="0"/>
-                <a:ea typeface="Calibri" panose="020F0502020204030204" pitchFamily="34" charset="0"/>
-                <a:cs typeface="Times New Roman" panose="02020603050405020304" pitchFamily="18" charset="0"/>
-              </a:rPr>
-              <a:t>étapes planifiées </a:t>
-            </a:r>
-            <a:r>
-              <a:rPr lang="fr-CA" b="1" dirty="0">
-                <a:effectLst/>
-                <a:latin typeface="Calibri" panose="020F0502020204030204" pitchFamily="34" charset="0"/>
-                <a:ea typeface="Calibri" panose="020F0502020204030204" pitchFamily="34" charset="0"/>
-                <a:cs typeface="Times New Roman" panose="02020603050405020304" pitchFamily="18" charset="0"/>
-              </a:rPr>
-              <a:t>: </a:t>
+              <a:t> :</a:t>
             </a:r>
           </a:p>
           <a:p>
@@ -13205,13 +13109,64 @@
               <a:buChar char=""/>
             </a:pPr>
             <a:r>
-              <a:rPr lang="fr-CA" sz="1800" b="1" dirty="0">
+              <a:rPr lang="fr-CA" sz="2400" b="1" dirty="0">
                 <a:effectLst/>
                 <a:latin typeface="Calibri" panose="020F0502020204030204" pitchFamily="34" charset="0"/>
                 <a:ea typeface="Calibri" panose="020F0502020204030204" pitchFamily="34" charset="0"/>
                 <a:cs typeface="Times New Roman" panose="02020603050405020304" pitchFamily="18" charset="0"/>
               </a:rPr>
-              <a:t>Faire le plein d’essence,</a:t>
+              <a:t>Les services </a:t>
+            </a:r>
+            <a:r>
+              <a:rPr lang="fr-CA" sz="2400" b="1" dirty="0">
+                <a:latin typeface="Calibri" panose="020F0502020204030204" pitchFamily="34" charset="0"/>
+                <a:ea typeface="Calibri" panose="020F0502020204030204" pitchFamily="34" charset="0"/>
+                <a:cs typeface="Times New Roman" panose="02020603050405020304" pitchFamily="18" charset="0"/>
+              </a:rPr>
+              <a:t>énergétiques : Le p</a:t>
+            </a:r>
+            <a:r>
+              <a:rPr lang="fr-CA" sz="2400" b="1" dirty="0">
+                <a:effectLst/>
+                <a:latin typeface="Calibri" panose="020F0502020204030204" pitchFamily="34" charset="0"/>
+                <a:ea typeface="Calibri" panose="020F0502020204030204" pitchFamily="34" charset="0"/>
+                <a:cs typeface="Times New Roman" panose="02020603050405020304" pitchFamily="18" charset="0"/>
+              </a:rPr>
+              <a:t>lein </a:t>
+            </a:r>
+            <a:r>
+              <a:rPr lang="fr-CA" sz="2400" b="1">
+                <a:effectLst/>
+                <a:latin typeface="Calibri" panose="020F0502020204030204" pitchFamily="34" charset="0"/>
+                <a:ea typeface="Calibri" panose="020F0502020204030204" pitchFamily="34" charset="0"/>
+                <a:cs typeface="Times New Roman" panose="02020603050405020304" pitchFamily="18" charset="0"/>
+              </a:rPr>
+              <a:t>d’essence</a:t>
+            </a:r>
+            <a:r>
+              <a:rPr lang="fr-CA" sz="2400" b="1">
+                <a:latin typeface="Calibri" panose="020F0502020204030204" pitchFamily="34" charset="0"/>
+                <a:ea typeface="Calibri" panose="020F0502020204030204" pitchFamily="34" charset="0"/>
+                <a:cs typeface="Times New Roman" panose="02020603050405020304" pitchFamily="18" charset="0"/>
+              </a:rPr>
+              <a:t> ou </a:t>
+            </a:r>
+            <a:r>
+              <a:rPr lang="fr-CA" sz="2400" b="1" dirty="0">
+                <a:latin typeface="Calibri" panose="020F0502020204030204" pitchFamily="34" charset="0"/>
+                <a:ea typeface="Calibri" panose="020F0502020204030204" pitchFamily="34" charset="0"/>
+                <a:cs typeface="Times New Roman" panose="02020603050405020304" pitchFamily="18" charset="0"/>
+              </a:rPr>
+              <a:t>la r</a:t>
+            </a:r>
+            <a:r>
+              <a:rPr lang="fr-CA" sz="2400" b="1" dirty="0">
+                <a:effectLst/>
+                <a:latin typeface="Calibri" panose="020F0502020204030204" pitchFamily="34" charset="0"/>
+                <a:ea typeface="Calibri" panose="020F0502020204030204" pitchFamily="34" charset="0"/>
+                <a:cs typeface="Times New Roman" panose="02020603050405020304" pitchFamily="18" charset="0"/>
+              </a:rPr>
+              <a:t>echarge électrique,</a:t>
             </a:r>
           </a:p>
           <a:p>
@@ -13223,31 +13178,21 @@
               <a:buChar char=""/>
             </a:pPr>
             <a:r>
-              <a:rPr lang="fr-CA" sz="1800" b="1" dirty="0">
+              <a:rPr lang="fr-CA" sz="2400" b="1" dirty="0">
+                <a:latin typeface="Calibri" panose="020F0502020204030204" pitchFamily="34" charset="0"/>
+                <a:ea typeface="Calibri" panose="020F0502020204030204" pitchFamily="34" charset="0"/>
+                <a:cs typeface="Times New Roman" panose="02020603050405020304" pitchFamily="18" charset="0"/>
+              </a:rPr>
+              <a:t>S</a:t>
+            </a:r>
+            <a:r>
+              <a:rPr lang="fr-CA" sz="2400" b="1" dirty="0">
                 <a:effectLst/>
                 <a:latin typeface="Calibri" panose="020F0502020204030204" pitchFamily="34" charset="0"/>
                 <a:ea typeface="Calibri" panose="020F0502020204030204" pitchFamily="34" charset="0"/>
                 <a:cs typeface="Times New Roman" panose="02020603050405020304" pitchFamily="18" charset="0"/>
               </a:rPr>
-              <a:t>Recharge électrique,</a:t>
-            </a:r>
-          </a:p>
-          <a:p>
-            <a:pPr marL="342900" lvl="0" indent="-342900" algn="just">
-              <a:lnSpc>
-                <a:spcPct val="107000"/>
-              </a:lnSpc>
-              <a:buFont typeface="Symbol" panose="05050102010706020507" pitchFamily="18" charset="2"/>
-              <a:buChar char=""/>
-            </a:pPr>
-            <a:r>
-              <a:rPr lang="fr-CA" sz="1800" b="1" dirty="0">
-                <a:effectLst/>
-                <a:latin typeface="Calibri" panose="020F0502020204030204" pitchFamily="34" charset="0"/>
-                <a:ea typeface="Calibri" panose="020F0502020204030204" pitchFamily="34" charset="0"/>
-                <a:cs typeface="Times New Roman" panose="02020603050405020304" pitchFamily="18" charset="0"/>
-              </a:rPr>
-              <a:t>Restaurant,</a:t>
+              <a:t>e rassasier dans un bon restaurant ou encore,</a:t>
             </a:r>
           </a:p>
           <a:p>
@@ -13262,21 +13207,291 @@
               <a:buChar char=""/>
             </a:pPr>
             <a:r>
-              <a:rPr lang="fr-CA" sz="1800" b="1" dirty="0">
+              <a:rPr lang="fr-CA" sz="2400" b="1" dirty="0">
+                <a:latin typeface="Calibri" panose="020F0502020204030204" pitchFamily="34" charset="0"/>
+                <a:ea typeface="Calibri" panose="020F0502020204030204" pitchFamily="34" charset="0"/>
+                <a:cs typeface="Times New Roman" panose="02020603050405020304" pitchFamily="18" charset="0"/>
+              </a:rPr>
+              <a:t>S</a:t>
+            </a:r>
+            <a:r>
+              <a:rPr lang="fr-CA" sz="2400" b="1" dirty="0">
                 <a:effectLst/>
                 <a:latin typeface="Calibri" panose="020F0502020204030204" pitchFamily="34" charset="0"/>
                 <a:ea typeface="Calibri" panose="020F0502020204030204" pitchFamily="34" charset="0"/>
                 <a:cs typeface="Times New Roman" panose="02020603050405020304" pitchFamily="18" charset="0"/>
               </a:rPr>
-              <a:t>Hébergement.</a:t>
+              <a:t>e reposer dans un hôtel</a:t>
             </a:r>
+            <a:r>
+              <a:rPr lang="fr-CA" sz="2400" b="1" dirty="0">
+                <a:latin typeface="Calibri" panose="020F0502020204030204" pitchFamily="34" charset="0"/>
+                <a:ea typeface="Calibri" panose="020F0502020204030204" pitchFamily="34" charset="0"/>
+                <a:cs typeface="Times New Roman" panose="02020603050405020304" pitchFamily="18" charset="0"/>
+              </a:rPr>
+              <a:t> 3, 4 ou 5 étoiles</a:t>
+            </a:r>
+            <a:r>
+              <a:rPr lang="fr-CA" sz="2400" b="1" dirty="0">
+                <a:effectLst/>
+                <a:latin typeface="Calibri" panose="020F0502020204030204" pitchFamily="34" charset="0"/>
+                <a:ea typeface="Calibri" panose="020F0502020204030204" pitchFamily="34" charset="0"/>
+                <a:cs typeface="Times New Roman" panose="02020603050405020304" pitchFamily="18" charset="0"/>
+              </a:rPr>
+              <a:t>.</a:t>
+            </a:r>
+          </a:p>
+          <a:p>
+            <a:pPr lvl="0" algn="just">
+              <a:lnSpc>
+                <a:spcPct val="107000"/>
+              </a:lnSpc>
+              <a:spcAft>
+                <a:spcPts val="800"/>
+              </a:spcAft>
+            </a:pPr>
+            <a:endParaRPr lang="fr-CA" b="1" dirty="0">
+              <a:latin typeface="Calibri" panose="020F0502020204030204" pitchFamily="34" charset="0"/>
+              <a:ea typeface="Calibri" panose="020F0502020204030204" pitchFamily="34" charset="0"/>
+              <a:cs typeface="Times New Roman" panose="02020603050405020304" pitchFamily="18" charset="0"/>
+            </a:endParaRPr>
+          </a:p>
+        </p:txBody>
+      </p:sp>
+      <p:sp>
+        <p:nvSpPr>
+          <p:cNvPr id="2" name="Étoile : 5 branches 1">
+            <a:extLst>
+              <a:ext uri="{FF2B5EF4-FFF2-40B4-BE49-F238E27FC236}">
+                <a16:creationId xmlns:a16="http://schemas.microsoft.com/office/drawing/2014/main" id="{B10B714E-0643-F1BC-78DF-58385099CB81}"/>
+              </a:ext>
+            </a:extLst>
+          </p:cNvPr>
+          <p:cNvSpPr/>
+          <p:nvPr/>
+        </p:nvSpPr>
+        <p:spPr>
+          <a:xfrm>
+            <a:off x="4879818" y="4969398"/>
+            <a:ext cx="425512" cy="425513"/>
+          </a:xfrm>
+          <a:prstGeom prst="star5">
+            <a:avLst/>
+          </a:prstGeom>
+        </p:spPr>
+        <p:style>
+          <a:lnRef idx="2">
+            <a:schemeClr val="accent3">
+              <a:shade val="50000"/>
+            </a:schemeClr>
+          </a:lnRef>
+          <a:fillRef idx="1">
+            <a:schemeClr val="accent3"/>
+          </a:fillRef>
+          <a:effectRef idx="0">
+            <a:schemeClr val="accent3"/>
+          </a:effectRef>
+          <a:fontRef idx="minor">
+            <a:schemeClr val="lt1"/>
+          </a:fontRef>
+        </p:style>
+        <p:txBody>
+          <a:bodyPr rtlCol="0" anchor="ctr"/>
+          <a:lstStyle/>
+          <a:p>
+            <a:pPr algn="ctr"/>
+            <a:endParaRPr lang="fr-CA"/>
+          </a:p>
+        </p:txBody>
+      </p:sp>
+      <p:sp>
+        <p:nvSpPr>
+          <p:cNvPr id="16" name="Étoile : 5 branches 15">
+            <a:extLst>
+              <a:ext uri="{FF2B5EF4-FFF2-40B4-BE49-F238E27FC236}">
+                <a16:creationId xmlns:a16="http://schemas.microsoft.com/office/drawing/2014/main" id="{DDF91AD3-CB9A-4179-F113-617EC4EBDAAB}"/>
+              </a:ext>
+            </a:extLst>
+          </p:cNvPr>
+          <p:cNvSpPr/>
+          <p:nvPr/>
+        </p:nvSpPr>
+        <p:spPr>
+          <a:xfrm>
+            <a:off x="5355125" y="4967889"/>
+            <a:ext cx="425512" cy="425513"/>
+          </a:xfrm>
+          <a:prstGeom prst="star5">
+            <a:avLst/>
+          </a:prstGeom>
+        </p:spPr>
+        <p:style>
+          <a:lnRef idx="2">
+            <a:schemeClr val="accent3">
+              <a:shade val="50000"/>
+            </a:schemeClr>
+          </a:lnRef>
+          <a:fillRef idx="1">
+            <a:schemeClr val="accent3"/>
+          </a:fillRef>
+          <a:effectRef idx="0">
+            <a:schemeClr val="accent3"/>
+          </a:effectRef>
+          <a:fontRef idx="minor">
+            <a:schemeClr val="lt1"/>
+          </a:fontRef>
+        </p:style>
+        <p:txBody>
+          <a:bodyPr rtlCol="0" anchor="ctr"/>
+          <a:lstStyle/>
+          <a:p>
+            <a:pPr algn="ctr"/>
+            <a:endParaRPr lang="fr-CA"/>
+          </a:p>
+        </p:txBody>
+      </p:sp>
+      <p:sp>
+        <p:nvSpPr>
+          <p:cNvPr id="17" name="Étoile : 5 branches 16">
+            <a:extLst>
+              <a:ext uri="{FF2B5EF4-FFF2-40B4-BE49-F238E27FC236}">
+                <a16:creationId xmlns:a16="http://schemas.microsoft.com/office/drawing/2014/main" id="{0016BCD3-26A3-73EB-AFD4-EBFDC6468C97}"/>
+              </a:ext>
+            </a:extLst>
+          </p:cNvPr>
+          <p:cNvSpPr/>
+          <p:nvPr/>
+        </p:nvSpPr>
+        <p:spPr>
+          <a:xfrm>
+            <a:off x="5830432" y="4967889"/>
+            <a:ext cx="425512" cy="425513"/>
+          </a:xfrm>
+          <a:prstGeom prst="star5">
+            <a:avLst/>
+          </a:prstGeom>
+        </p:spPr>
+        <p:style>
+          <a:lnRef idx="2">
+            <a:schemeClr val="accent3">
+              <a:shade val="50000"/>
+            </a:schemeClr>
+          </a:lnRef>
+          <a:fillRef idx="1">
+            <a:schemeClr val="accent3"/>
+          </a:fillRef>
+          <a:effectRef idx="0">
+            <a:schemeClr val="accent3"/>
+          </a:effectRef>
+          <a:fontRef idx="minor">
+            <a:schemeClr val="lt1"/>
+          </a:fontRef>
+        </p:style>
+        <p:txBody>
+          <a:bodyPr rtlCol="0" anchor="ctr"/>
+          <a:lstStyle/>
+          <a:p>
+            <a:pPr algn="ctr"/>
+            <a:endParaRPr lang="fr-CA"/>
+          </a:p>
+        </p:txBody>
+      </p:sp>
+      <p:sp>
+        <p:nvSpPr>
+          <p:cNvPr id="18" name="Étoile : 5 branches 17">
+            <a:extLst>
+              <a:ext uri="{FF2B5EF4-FFF2-40B4-BE49-F238E27FC236}">
+                <a16:creationId xmlns:a16="http://schemas.microsoft.com/office/drawing/2014/main" id="{6CD371AA-0179-87B6-7AB8-CC143C6B013E}"/>
+              </a:ext>
+            </a:extLst>
+          </p:cNvPr>
+          <p:cNvSpPr/>
+          <p:nvPr/>
+        </p:nvSpPr>
+        <p:spPr>
+          <a:xfrm>
+            <a:off x="6308756" y="4966028"/>
+            <a:ext cx="425512" cy="425513"/>
+          </a:xfrm>
+          <a:prstGeom prst="star5">
+            <a:avLst/>
+          </a:prstGeom>
+        </p:spPr>
+        <p:style>
+          <a:lnRef idx="2">
+            <a:schemeClr val="accent3">
+              <a:shade val="50000"/>
+            </a:schemeClr>
+          </a:lnRef>
+          <a:fillRef idx="1">
+            <a:schemeClr val="accent3"/>
+          </a:fillRef>
+          <a:effectRef idx="0">
+            <a:schemeClr val="accent3"/>
+          </a:effectRef>
+          <a:fontRef idx="minor">
+            <a:schemeClr val="lt1"/>
+          </a:fontRef>
+        </p:style>
+        <p:txBody>
+          <a:bodyPr rtlCol="0" anchor="ctr"/>
+          <a:lstStyle/>
+          <a:p>
+            <a:pPr algn="ctr"/>
+            <a:endParaRPr lang="fr-CA"/>
+          </a:p>
+        </p:txBody>
+      </p:sp>
+      <p:sp>
+        <p:nvSpPr>
+          <p:cNvPr id="19" name="Étoile : 5 branches 18">
+            <a:extLst>
+              <a:ext uri="{FF2B5EF4-FFF2-40B4-BE49-F238E27FC236}">
+                <a16:creationId xmlns:a16="http://schemas.microsoft.com/office/drawing/2014/main" id="{896EC9C9-BB5C-DBE0-1E62-057719BB6B59}"/>
+              </a:ext>
+            </a:extLst>
+          </p:cNvPr>
+          <p:cNvSpPr/>
+          <p:nvPr/>
+        </p:nvSpPr>
+        <p:spPr>
+          <a:xfrm>
+            <a:off x="6758416" y="4966028"/>
+            <a:ext cx="425512" cy="425513"/>
+          </a:xfrm>
+          <a:prstGeom prst="star5">
+            <a:avLst/>
+          </a:prstGeom>
+        </p:spPr>
+        <p:style>
+          <a:lnRef idx="2">
+            <a:schemeClr val="accent3">
+              <a:shade val="50000"/>
+            </a:schemeClr>
+          </a:lnRef>
+          <a:fillRef idx="1">
+            <a:schemeClr val="accent3"/>
+          </a:fillRef>
+          <a:effectRef idx="0">
+            <a:schemeClr val="accent3"/>
+          </a:effectRef>
+          <a:fontRef idx="minor">
+            <a:schemeClr val="lt1"/>
+          </a:fontRef>
+        </p:style>
+        <p:txBody>
+          <a:bodyPr rtlCol="0" anchor="ctr"/>
+          <a:lstStyle/>
+          <a:p>
+            <a:pPr algn="ctr"/>
+            <a:endParaRPr lang="fr-CA"/>
           </a:p>
         </p:txBody>
       </p:sp>
     </p:spTree>
     <p:extLst>
       <p:ext uri="{BB962C8B-B14F-4D97-AF65-F5344CB8AC3E}">
-        <p14:creationId xmlns:p14="http://schemas.microsoft.com/office/powerpoint/2010/main" val="1997239787"/>
+        <p14:creationId xmlns:p14="http://schemas.microsoft.com/office/powerpoint/2010/main" val="4230979803"/>
       </p:ext>
     </p:extLst>
   </p:cSld>
@@ -13714,8 +13929,8 @@
         </p:nvSpPr>
         <p:spPr>
           <a:xfrm>
-            <a:off x="712206" y="1988569"/>
-            <a:ext cx="10559357" cy="3441776"/>
+            <a:off x="1569266" y="2741130"/>
+            <a:ext cx="8845236" cy="1926553"/>
           </a:xfrm>
           <a:prstGeom prst="rect">
             <a:avLst/>
@@ -13737,197 +13952,143 @@
               </a:spcAft>
             </a:pPr>
             <a:r>
-              <a:rPr lang="fr-CA" b="1" dirty="0">
+              <a:rPr lang="fr-CA" sz="2400" b="1" dirty="0">
                 <a:effectLst/>
                 <a:latin typeface="Calibri" panose="020F0502020204030204" pitchFamily="34" charset="0"/>
                 <a:ea typeface="Calibri" panose="020F0502020204030204" pitchFamily="34" charset="0"/>
                 <a:cs typeface="Times New Roman" panose="02020603050405020304" pitchFamily="18" charset="0"/>
               </a:rPr>
-              <a:t>La configuration de l’application permet de saisir les informations sur les éléments suivants :</a:t>
+              <a:t>À l’aide d’une configuration simple et efficace, </a:t>
             </a:r>
-          </a:p>
-          <a:p>
-            <a:pPr marL="342900" lvl="0" indent="-342900" algn="just">
-              <a:lnSpc>
-                <a:spcPct val="107000"/>
-              </a:lnSpc>
-              <a:buFont typeface="Symbol" panose="05050102010706020507" pitchFamily="18" charset="2"/>
-              <a:buChar char=""/>
-            </a:pPr>
             <a:r>
-              <a:rPr lang="fr-CA" b="1" dirty="0">
+              <a:rPr lang="fr-CA" sz="2800" b="1" dirty="0">
+                <a:solidFill>
+                  <a:srgbClr val="0071C1"/>
+                </a:solidFill>
                 <a:effectLst/>
                 <a:latin typeface="Calibri" panose="020F0502020204030204" pitchFamily="34" charset="0"/>
                 <a:ea typeface="Calibri" panose="020F0502020204030204" pitchFamily="34" charset="0"/>
                 <a:cs typeface="Times New Roman" panose="02020603050405020304" pitchFamily="18" charset="0"/>
               </a:rPr>
-              <a:t>Les Véhicules : (automobile)</a:t>
+              <a:t>Itinéraire</a:t>
             </a:r>
-          </a:p>
-          <a:p>
-            <a:pPr marL="742950" lvl="1" indent="-285750" algn="just">
-              <a:lnSpc>
-                <a:spcPct val="107000"/>
-              </a:lnSpc>
-              <a:buFont typeface="Courier New" panose="02070309020205020404" pitchFamily="49" charset="0"/>
-              <a:buChar char="o"/>
-            </a:pPr>
             <a:r>
-              <a:rPr lang="fr-CA" b="1" dirty="0">
+              <a:rPr lang="fr-CA" sz="2800" b="1" dirty="0">
                 <a:effectLst/>
                 <a:latin typeface="Calibri" panose="020F0502020204030204" pitchFamily="34" charset="0"/>
                 <a:ea typeface="Calibri" panose="020F0502020204030204" pitchFamily="34" charset="0"/>
                 <a:cs typeface="Times New Roman" panose="02020603050405020304" pitchFamily="18" charset="0"/>
               </a:rPr>
-              <a:t>Type d’énergie (essence, électrique),</a:t>
+              <a:t> </a:t>
             </a:r>
-          </a:p>
-          <a:p>
-            <a:pPr marL="742950" lvl="1" indent="-285750" algn="just">
-              <a:lnSpc>
-                <a:spcPct val="107000"/>
-              </a:lnSpc>
-              <a:buFont typeface="Courier New" panose="02070309020205020404" pitchFamily="49" charset="0"/>
-              <a:buChar char="o"/>
-            </a:pPr>
             <a:r>
-              <a:rPr lang="fr-CA" b="1" dirty="0">
+              <a:rPr lang="fr-CA" sz="2800" b="1" dirty="0">
+                <a:solidFill>
+                  <a:srgbClr val="203864"/>
+                </a:solidFill>
                 <a:effectLst/>
                 <a:latin typeface="Calibri" panose="020F0502020204030204" pitchFamily="34" charset="0"/>
                 <a:ea typeface="Calibri" panose="020F0502020204030204" pitchFamily="34" charset="0"/>
                 <a:cs typeface="Times New Roman" panose="02020603050405020304" pitchFamily="18" charset="0"/>
               </a:rPr>
-              <a:t>Distance parcourable, (km)</a:t>
+              <a:t>Plus</a:t>
             </a:r>
-          </a:p>
-          <a:p>
-            <a:pPr marL="742950" lvl="1" indent="-285750" algn="just">
-              <a:lnSpc>
-                <a:spcPct val="107000"/>
-              </a:lnSpc>
-              <a:buFont typeface="Courier New" panose="02070309020205020404" pitchFamily="49" charset="0"/>
-              <a:buChar char="o"/>
-            </a:pPr>
             <a:r>
-              <a:rPr lang="fr-CA" b="1" dirty="0">
+              <a:rPr lang="fr-CA" sz="2800" b="1" dirty="0">
                 <a:effectLst/>
                 <a:latin typeface="Calibri" panose="020F0502020204030204" pitchFamily="34" charset="0"/>
                 <a:ea typeface="Calibri" panose="020F0502020204030204" pitchFamily="34" charset="0"/>
                 <a:cs typeface="Times New Roman" panose="02020603050405020304" pitchFamily="18" charset="0"/>
               </a:rPr>
-              <a:t>Consommation (litre ou kWh au 100km).</a:t>
+              <a:t> </a:t>
             </a:r>
-          </a:p>
-          <a:p>
-            <a:pPr marL="342900" lvl="0" indent="-342900" algn="just">
-              <a:lnSpc>
-                <a:spcPct val="107000"/>
-              </a:lnSpc>
-              <a:buFont typeface="Symbol" panose="05050102010706020507" pitchFamily="18" charset="2"/>
-              <a:buChar char=""/>
-            </a:pPr>
             <a:r>
-              <a:rPr lang="fr-CA" b="1" dirty="0">
+              <a:rPr lang="fr-CA" sz="2800" b="1" dirty="0" err="1">
+                <a:solidFill>
+                  <a:srgbClr val="0071C1"/>
+                </a:solidFill>
                 <a:effectLst/>
                 <a:latin typeface="Calibri" panose="020F0502020204030204" pitchFamily="34" charset="0"/>
                 <a:ea typeface="Calibri" panose="020F0502020204030204" pitchFamily="34" charset="0"/>
                 <a:cs typeface="Times New Roman" panose="02020603050405020304" pitchFamily="18" charset="0"/>
               </a:rPr>
-              <a:t>Les activités :</a:t>
+              <a:t>Plus</a:t>
             </a:r>
-          </a:p>
-          <a:p>
-            <a:pPr marL="742950" lvl="1" indent="-285750" algn="just">
-              <a:lnSpc>
-                <a:spcPct val="107000"/>
-              </a:lnSpc>
-              <a:buFont typeface="Courier New" panose="02070309020205020404" pitchFamily="49" charset="0"/>
-              <a:buChar char="o"/>
-            </a:pPr>
             <a:r>
-              <a:rPr lang="fr-CA" b="1" dirty="0">
+              <a:rPr lang="fr-CA" sz="2800" b="1" dirty="0">
                 <a:effectLst/>
                 <a:latin typeface="Calibri" panose="020F0502020204030204" pitchFamily="34" charset="0"/>
                 <a:ea typeface="Calibri" panose="020F0502020204030204" pitchFamily="34" charset="0"/>
                 <a:cs typeface="Times New Roman" panose="02020603050405020304" pitchFamily="18" charset="0"/>
               </a:rPr>
-              <a:t>Durée de l’arrêt de l’activité,</a:t>
+              <a:t> </a:t>
             </a:r>
-          </a:p>
-          <a:p>
-            <a:pPr marL="742950" lvl="1" indent="-285750" algn="just">
-              <a:lnSpc>
-                <a:spcPct val="107000"/>
-              </a:lnSpc>
-              <a:buFont typeface="Courier New" panose="02070309020205020404" pitchFamily="49" charset="0"/>
-              <a:buChar char="o"/>
-            </a:pPr>
             <a:r>
-              <a:rPr lang="fr-CA" b="1" dirty="0">
+              <a:rPr lang="fr-CA" sz="2400" b="1" dirty="0">
                 <a:effectLst/>
                 <a:latin typeface="Calibri" panose="020F0502020204030204" pitchFamily="34" charset="0"/>
                 <a:ea typeface="Calibri" panose="020F0502020204030204" pitchFamily="34" charset="0"/>
                 <a:cs typeface="Times New Roman" panose="02020603050405020304" pitchFamily="18" charset="0"/>
               </a:rPr>
-              <a:t>Intervalle de temps entre chaque arrêt de cette activité.</a:t>
+              <a:t>se veux facile d’utilisation.</a:t>
             </a:r>
           </a:p>
           <a:p>
-            <a:pPr marL="342900" lvl="0" indent="-342900" algn="just">
-              <a:lnSpc>
-                <a:spcPct val="107000"/>
-              </a:lnSpc>
-              <a:buFont typeface="Symbol" panose="05050102010706020507" pitchFamily="18" charset="2"/>
-              <a:buChar char=""/>
-            </a:pPr>
-            <a:r>
-              <a:rPr lang="fr-CA" b="1" dirty="0">
-                <a:effectLst/>
-                <a:latin typeface="Calibri" panose="020F0502020204030204" pitchFamily="34" charset="0"/>
-                <a:ea typeface="Calibri" panose="020F0502020204030204" pitchFamily="34" charset="0"/>
-                <a:cs typeface="Times New Roman" panose="02020603050405020304" pitchFamily="18" charset="0"/>
-              </a:rPr>
-              <a:t>Types d’énergie (essence, électrique) :</a:t>
-            </a:r>
-          </a:p>
-          <a:p>
-            <a:pPr marL="742950" lvl="1" indent="-285750" algn="just">
-              <a:lnSpc>
-                <a:spcPct val="107000"/>
-              </a:lnSpc>
-              <a:buFont typeface="Courier New" panose="02070309020205020404" pitchFamily="49" charset="0"/>
-              <a:buChar char="o"/>
-            </a:pPr>
-            <a:r>
-              <a:rPr lang="fr-CA" b="1" dirty="0">
-                <a:effectLst/>
-                <a:latin typeface="Calibri" panose="020F0502020204030204" pitchFamily="34" charset="0"/>
-                <a:ea typeface="Calibri" panose="020F0502020204030204" pitchFamily="34" charset="0"/>
-                <a:cs typeface="Times New Roman" panose="02020603050405020304" pitchFamily="18" charset="0"/>
-              </a:rPr>
-              <a:t>Prix,</a:t>
-            </a:r>
-          </a:p>
-          <a:p>
-            <a:pPr marL="742950" lvl="1" indent="-285750" algn="just">
+            <a:pPr algn="just">
               <a:lnSpc>
                 <a:spcPct val="107000"/>
               </a:lnSpc>
               <a:spcAft>
                 <a:spcPts val="800"/>
               </a:spcAft>
-              <a:buFont typeface="Courier New" panose="02070309020205020404" pitchFamily="49" charset="0"/>
-              <a:buChar char="o"/>
+            </a:pPr>
+            <a:endParaRPr lang="fr-CA" sz="2400" b="1" dirty="0">
+              <a:effectLst/>
+              <a:latin typeface="Calibri" panose="020F0502020204030204" pitchFamily="34" charset="0"/>
+              <a:ea typeface="Calibri" panose="020F0502020204030204" pitchFamily="34" charset="0"/>
+              <a:cs typeface="Times New Roman" panose="02020603050405020304" pitchFamily="18" charset="0"/>
+            </a:endParaRPr>
+          </a:p>
+          <a:p>
+            <a:pPr algn="just">
+              <a:lnSpc>
+                <a:spcPct val="107000"/>
+              </a:lnSpc>
+              <a:spcAft>
+                <a:spcPts val="800"/>
+              </a:spcAft>
             </a:pPr>
             <a:r>
-              <a:rPr lang="fr-CA" b="1" dirty="0">
+              <a:rPr lang="fr-CA" sz="2400" b="1" dirty="0">
+                <a:latin typeface="Calibri" panose="020F0502020204030204" pitchFamily="34" charset="0"/>
+                <a:ea typeface="Calibri" panose="020F0502020204030204" pitchFamily="34" charset="0"/>
+                <a:cs typeface="Times New Roman" panose="02020603050405020304" pitchFamily="18" charset="0"/>
+              </a:rPr>
+              <a:t>Toute</a:t>
+            </a:r>
+            <a:r>
+              <a:rPr lang="fr-CA" sz="2400" b="1" dirty="0">
                 <a:effectLst/>
                 <a:latin typeface="Calibri" panose="020F0502020204030204" pitchFamily="34" charset="0"/>
                 <a:ea typeface="Calibri" panose="020F0502020204030204" pitchFamily="34" charset="0"/>
                 <a:cs typeface="Times New Roman" panose="02020603050405020304" pitchFamily="18" charset="0"/>
               </a:rPr>
-              <a:t>Unité. (litre ou kWh)</a:t>
+              <a:t> nouvelle destination</a:t>
             </a:r>
+            <a:r>
+              <a:rPr lang="fr-CA" sz="2400" b="1" dirty="0">
+                <a:latin typeface="Calibri" panose="020F0502020204030204" pitchFamily="34" charset="0"/>
+                <a:ea typeface="Calibri" panose="020F0502020204030204" pitchFamily="34" charset="0"/>
+                <a:cs typeface="Times New Roman" panose="02020603050405020304" pitchFamily="18" charset="0"/>
+              </a:rPr>
+              <a:t> contient ses propres activités.</a:t>
+            </a:r>
+            <a:endParaRPr lang="fr-CA" sz="2400" b="1" dirty="0">
+              <a:effectLst/>
+              <a:latin typeface="Calibri" panose="020F0502020204030204" pitchFamily="34" charset="0"/>
+              <a:ea typeface="Calibri" panose="020F0502020204030204" pitchFamily="34" charset="0"/>
+              <a:cs typeface="Times New Roman" panose="02020603050405020304" pitchFamily="18" charset="0"/>
+            </a:endParaRPr>
           </a:p>
         </p:txBody>
       </p:sp>
@@ -14372,8 +14533,8 @@
         </p:nvSpPr>
         <p:spPr>
           <a:xfrm>
-            <a:off x="712206" y="1988569"/>
-            <a:ext cx="10559357" cy="3453189"/>
+            <a:off x="1689980" y="2661042"/>
+            <a:ext cx="8812040" cy="1963294"/>
           </a:xfrm>
           <a:prstGeom prst="rect">
             <a:avLst/>
@@ -14395,13 +14556,31 @@
               </a:spcAft>
             </a:pPr>
             <a:r>
-              <a:rPr lang="fr-CA" b="1" dirty="0">
+              <a:rPr lang="fr-CA" sz="2400" b="1" dirty="0">
                 <a:effectLst/>
                 <a:latin typeface="Calibri" panose="020F0502020204030204" pitchFamily="34" charset="0"/>
                 <a:ea typeface="Calibri" panose="020F0502020204030204" pitchFamily="34" charset="0"/>
                 <a:cs typeface="Times New Roman" panose="02020603050405020304" pitchFamily="18" charset="0"/>
               </a:rPr>
-              <a:t>À l’aide de ces informations, l’application mobile calculera d’abord l’itinéraire.</a:t>
+              <a:t>Enfin, un rapport d’estimation est établi pour </a:t>
+            </a:r>
+            <a:r>
+              <a:rPr lang="fr-CA" sz="2400" b="1" u="sng" dirty="0">
+                <a:effectLst/>
+                <a:latin typeface="Calibri" panose="020F0502020204030204" pitchFamily="34" charset="0"/>
+                <a:ea typeface="Calibri" panose="020F0502020204030204" pitchFamily="34" charset="0"/>
+                <a:cs typeface="Times New Roman" panose="02020603050405020304" pitchFamily="18" charset="0"/>
+              </a:rPr>
+              <a:t>chaque</a:t>
+            </a:r>
+            <a:r>
+              <a:rPr lang="fr-CA" sz="2400" b="1" dirty="0">
+                <a:effectLst/>
+                <a:latin typeface="Calibri" panose="020F0502020204030204" pitchFamily="34" charset="0"/>
+                <a:ea typeface="Calibri" panose="020F0502020204030204" pitchFamily="34" charset="0"/>
+                <a:cs typeface="Times New Roman" panose="02020603050405020304" pitchFamily="18" charset="0"/>
+              </a:rPr>
+              <a:t> destination.</a:t>
             </a:r>
           </a:p>
           <a:p>
@@ -14414,109 +14593,17 @@
               </a:spcAft>
             </a:pPr>
             <a:r>
-              <a:rPr lang="fr-CA" b="1" dirty="0">
+              <a:rPr lang="fr-CA" sz="2400" b="1" dirty="0">
                 <a:effectLst/>
                 <a:latin typeface="Calibri" panose="020F0502020204030204" pitchFamily="34" charset="0"/>
                 <a:ea typeface="Calibri" panose="020F0502020204030204" pitchFamily="34" charset="0"/>
                 <a:cs typeface="Times New Roman" panose="02020603050405020304" pitchFamily="18" charset="0"/>
               </a:rPr>
-              <a:t>De plus, le trajet nouvellement calculé indiquera si des temps d’arrêts (étapes) seront nécessaires pour compléter le parcours.  (Ex. : Faire le plein/la recharge, Manger, Dormir)</a:t>
+              <a:t>	L’estimation comprend :</a:t>
             </a:r>
           </a:p>
           <a:p>
-            <a:pPr algn="just">
-              <a:lnSpc>
-                <a:spcPct val="107000"/>
-              </a:lnSpc>
-              <a:spcAft>
-                <a:spcPts val="800"/>
-              </a:spcAft>
-            </a:pPr>
-            <a:r>
-              <a:rPr lang="fr-CA" b="1" dirty="0">
-                <a:effectLst/>
-                <a:latin typeface="Calibri" panose="020F0502020204030204" pitchFamily="34" charset="0"/>
-                <a:ea typeface="Calibri" panose="020F0502020204030204" pitchFamily="34" charset="0"/>
-                <a:cs typeface="Times New Roman" panose="02020603050405020304" pitchFamily="18" charset="0"/>
-              </a:rPr>
-              <a:t>Chaque étape, a laquelle une activité aura été ajouté, les informations de proximités seront ajoutées tel que les stations d’essence/recharge, restaurants et hébergements disponible.</a:t>
-            </a:r>
-          </a:p>
-          <a:p>
-            <a:pPr algn="just">
-              <a:lnSpc>
-                <a:spcPct val="107000"/>
-              </a:lnSpc>
-              <a:spcAft>
-                <a:spcPts val="800"/>
-              </a:spcAft>
-            </a:pPr>
-            <a:r>
-              <a:rPr lang="fr-CA" b="1" dirty="0">
-                <a:effectLst/>
-                <a:latin typeface="Calibri" panose="020F0502020204030204" pitchFamily="34" charset="0"/>
-                <a:ea typeface="Calibri" panose="020F0502020204030204" pitchFamily="34" charset="0"/>
-                <a:cs typeface="Times New Roman" panose="02020603050405020304" pitchFamily="18" charset="0"/>
-              </a:rPr>
-              <a:t>Finalement un rapport d’estimation du trajet qui comprend :</a:t>
-            </a:r>
-          </a:p>
-          <a:p>
-            <a:pPr marL="342900" lvl="0" indent="-342900" algn="just">
-              <a:lnSpc>
-                <a:spcPct val="107000"/>
-              </a:lnSpc>
-              <a:buFont typeface="Symbol" panose="05050102010706020507" pitchFamily="18" charset="2"/>
-              <a:buChar char=""/>
-            </a:pPr>
-            <a:r>
-              <a:rPr lang="fr-CA" b="1" dirty="0">
-                <a:effectLst/>
-                <a:latin typeface="Calibri" panose="020F0502020204030204" pitchFamily="34" charset="0"/>
-                <a:ea typeface="Calibri" panose="020F0502020204030204" pitchFamily="34" charset="0"/>
-                <a:cs typeface="Times New Roman" panose="02020603050405020304" pitchFamily="18" charset="0"/>
-              </a:rPr>
-              <a:t>Les temps </a:t>
-            </a:r>
-          </a:p>
-          <a:p>
-            <a:pPr marL="742950" lvl="1" indent="-285750" algn="just">
-              <a:lnSpc>
-                <a:spcPct val="107000"/>
-              </a:lnSpc>
-              <a:buFont typeface="Courier New" panose="02070309020205020404" pitchFamily="49" charset="0"/>
-              <a:buChar char="o"/>
-            </a:pPr>
-            <a:r>
-              <a:rPr lang="fr-CA" b="1" dirty="0">
-                <a:effectLst/>
-                <a:latin typeface="Calibri" panose="020F0502020204030204" pitchFamily="34" charset="0"/>
-                <a:ea typeface="Calibri" panose="020F0502020204030204" pitchFamily="34" charset="0"/>
-                <a:cs typeface="Times New Roman" panose="02020603050405020304" pitchFamily="18" charset="0"/>
-              </a:rPr>
-              <a:t>De voyagement,</a:t>
-            </a:r>
-          </a:p>
-          <a:p>
-            <a:pPr marL="742950" lvl="1" indent="-285750" algn="just">
-              <a:lnSpc>
-                <a:spcPct val="107000"/>
-              </a:lnSpc>
-              <a:buFont typeface="Courier New" panose="02070309020205020404" pitchFamily="49" charset="0"/>
-              <a:buChar char="o"/>
-            </a:pPr>
-            <a:r>
-              <a:rPr lang="fr-CA" b="1" dirty="0">
-                <a:effectLst/>
-                <a:latin typeface="Calibri" panose="020F0502020204030204" pitchFamily="34" charset="0"/>
-                <a:ea typeface="Calibri" panose="020F0502020204030204" pitchFamily="34" charset="0"/>
-                <a:cs typeface="Times New Roman" panose="02020603050405020304" pitchFamily="18" charset="0"/>
-              </a:rPr>
-              <a:t>Des arrêts.</a:t>
-            </a:r>
-          </a:p>
-          <a:p>
-            <a:pPr marL="342900" lvl="0" indent="-342900" algn="just">
+            <a:pPr marL="1257300" lvl="2" indent="-342900" algn="just">
               <a:lnSpc>
                 <a:spcPct val="107000"/>
               </a:lnSpc>
@@ -14527,7 +14614,36 @@
               <a:buChar char=""/>
             </a:pPr>
             <a:r>
-              <a:rPr lang="fr-CA" b="1" dirty="0">
+              <a:rPr lang="fr-CA" sz="2400" b="1" dirty="0">
+                <a:latin typeface="Calibri" panose="020F0502020204030204" pitchFamily="34" charset="0"/>
+                <a:ea typeface="Calibri" panose="020F0502020204030204" pitchFamily="34" charset="0"/>
+                <a:cs typeface="Times New Roman" panose="02020603050405020304" pitchFamily="18" charset="0"/>
+              </a:rPr>
+              <a:t>Le temps de</a:t>
+            </a:r>
+            <a:r>
+              <a:rPr lang="fr-CA" sz="2400" b="1" dirty="0">
+                <a:effectLst/>
+                <a:latin typeface="Calibri" panose="020F0502020204030204" pitchFamily="34" charset="0"/>
+                <a:ea typeface="Calibri" panose="020F0502020204030204" pitchFamily="34" charset="0"/>
+                <a:cs typeface="Times New Roman" panose="02020603050405020304" pitchFamily="18" charset="0"/>
+              </a:rPr>
+              <a:t> déplacement et des arrêts,</a:t>
+            </a:r>
+          </a:p>
+          <a:p>
+            <a:pPr marL="1257300" lvl="2" indent="-342900" algn="just">
+              <a:lnSpc>
+                <a:spcPct val="107000"/>
+              </a:lnSpc>
+              <a:spcAft>
+                <a:spcPts val="800"/>
+              </a:spcAft>
+              <a:buFont typeface="Symbol" panose="05050102010706020507" pitchFamily="18" charset="2"/>
+              <a:buChar char=""/>
+            </a:pPr>
+            <a:r>
+              <a:rPr lang="fr-CA" sz="2400" b="1" dirty="0">
                 <a:effectLst/>
                 <a:latin typeface="Calibri" panose="020F0502020204030204" pitchFamily="34" charset="0"/>
                 <a:ea typeface="Calibri" panose="020F0502020204030204" pitchFamily="34" charset="0"/>
@@ -14976,8 +15092,8 @@
         </p:nvSpPr>
         <p:spPr>
           <a:xfrm>
-            <a:off x="712206" y="1988569"/>
-            <a:ext cx="10559357" cy="1868781"/>
+            <a:off x="4214388" y="1488397"/>
+            <a:ext cx="6117564" cy="3939155"/>
           </a:xfrm>
           <a:prstGeom prst="rect">
             <a:avLst/>
@@ -14990,7 +15106,7 @@
           </a:bodyPr>
           <a:lstStyle/>
           <a:p>
-            <a:pPr algn="just">
+            <a:pPr>
               <a:lnSpc>
                 <a:spcPct val="107000"/>
               </a:lnSpc>
@@ -14999,17 +15115,17 @@
               </a:spcAft>
             </a:pPr>
             <a:r>
-              <a:rPr lang="fr-CA" sz="1800" b="1" dirty="0">
+              <a:rPr lang="fr-CA" sz="2400" b="1" dirty="0">
                 <a:effectLst/>
                 <a:latin typeface="Calibri" panose="020F0502020204030204" pitchFamily="34" charset="0"/>
                 <a:ea typeface="Calibri" panose="020F0502020204030204" pitchFamily="34" charset="0"/>
                 <a:cs typeface="Times New Roman" panose="02020603050405020304" pitchFamily="18" charset="0"/>
               </a:rPr>
-              <a:t>L’application comprend les API suivantes :</a:t>
+              <a:t>- Utilise les API de Google :</a:t>
             </a:r>
           </a:p>
           <a:p>
-            <a:pPr marL="342900" lvl="0" indent="-342900" algn="just">
+            <a:pPr marL="342900" lvl="0" indent="-342900">
               <a:lnSpc>
                 <a:spcPct val="107000"/>
               </a:lnSpc>
@@ -15017,17 +15133,83 @@
               <a:buChar char=""/>
             </a:pPr>
             <a:r>
-              <a:rPr lang="fr-CA" sz="1800" b="1" dirty="0">
+              <a:rPr lang="fr-CA" sz="2400" i="1" dirty="0" err="1">
                 <a:effectLst/>
                 <a:latin typeface="Calibri" panose="020F0502020204030204" pitchFamily="34" charset="0"/>
                 <a:ea typeface="Calibri" panose="020F0502020204030204" pitchFamily="34" charset="0"/>
                 <a:cs typeface="Times New Roman" panose="02020603050405020304" pitchFamily="18" charset="0"/>
               </a:rPr>
-              <a:t>GoogleMaps</a:t>
+              <a:t>Maps</a:t>
+            </a:r>
+            <a:endParaRPr lang="fr-CA" sz="2400" i="1" dirty="0">
+              <a:effectLst/>
+              <a:latin typeface="Calibri" panose="020F0502020204030204" pitchFamily="34" charset="0"/>
+              <a:ea typeface="Calibri" panose="020F0502020204030204" pitchFamily="34" charset="0"/>
+              <a:cs typeface="Times New Roman" panose="02020603050405020304" pitchFamily="18" charset="0"/>
+            </a:endParaRPr>
+          </a:p>
+          <a:p>
+            <a:pPr marL="342900" lvl="0" indent="-342900">
+              <a:lnSpc>
+                <a:spcPct val="107000"/>
+              </a:lnSpc>
+              <a:buFont typeface="Symbol" panose="05050102010706020507" pitchFamily="18" charset="2"/>
+              <a:buChar char=""/>
+            </a:pPr>
+            <a:r>
+              <a:rPr lang="fr-CA" sz="2400" i="1" dirty="0" err="1">
+                <a:effectLst/>
+                <a:latin typeface="Calibri" panose="020F0502020204030204" pitchFamily="34" charset="0"/>
+                <a:ea typeface="Calibri" panose="020F0502020204030204" pitchFamily="34" charset="0"/>
+                <a:cs typeface="Times New Roman" panose="02020603050405020304" pitchFamily="18" charset="0"/>
+              </a:rPr>
+              <a:t>Nearby</a:t>
+            </a:r>
+            <a:endParaRPr lang="fr-CA" sz="2400" i="1" dirty="0">
+              <a:effectLst/>
+              <a:latin typeface="Calibri" panose="020F0502020204030204" pitchFamily="34" charset="0"/>
+              <a:ea typeface="Calibri" panose="020F0502020204030204" pitchFamily="34" charset="0"/>
+              <a:cs typeface="Times New Roman" panose="02020603050405020304" pitchFamily="18" charset="0"/>
+            </a:endParaRPr>
+          </a:p>
+          <a:p>
+            <a:pPr marL="342900" lvl="0" indent="-342900">
+              <a:lnSpc>
+                <a:spcPct val="107000"/>
+              </a:lnSpc>
+              <a:buFont typeface="Symbol" panose="05050102010706020507" pitchFamily="18" charset="2"/>
+              <a:buChar char=""/>
+            </a:pPr>
+            <a:r>
+              <a:rPr lang="fr-CA" sz="2400" i="1" dirty="0">
+                <a:effectLst/>
+                <a:latin typeface="Calibri" panose="020F0502020204030204" pitchFamily="34" charset="0"/>
+                <a:ea typeface="Calibri" panose="020F0502020204030204" pitchFamily="34" charset="0"/>
+                <a:cs typeface="Times New Roman" panose="02020603050405020304" pitchFamily="18" charset="0"/>
+              </a:rPr>
+              <a:t>Location</a:t>
             </a:r>
           </a:p>
           <a:p>
-            <a:pPr marL="342900" lvl="0" indent="-342900" algn="just">
+            <a:pPr marL="342900" lvl="0" indent="-342900">
+              <a:lnSpc>
+                <a:spcPct val="107000"/>
+              </a:lnSpc>
+              <a:buFont typeface="Symbol" panose="05050102010706020507" pitchFamily="18" charset="2"/>
+              <a:buChar char=""/>
+            </a:pPr>
+            <a:r>
+              <a:rPr lang="fr-CA" sz="2400" i="1" dirty="0">
+                <a:effectLst/>
+                <a:latin typeface="Calibri" panose="020F0502020204030204" pitchFamily="34" charset="0"/>
+                <a:ea typeface="Calibri" panose="020F0502020204030204" pitchFamily="34" charset="0"/>
+                <a:cs typeface="Times New Roman" panose="02020603050405020304" pitchFamily="18" charset="0"/>
+              </a:rPr>
+              <a:t>Direction</a:t>
+            </a:r>
+          </a:p>
+          <a:p>
+            <a:pPr marL="342900" lvl="0" indent="-342900">
               <a:lnSpc>
                 <a:spcPct val="107000"/>
               </a:lnSpc>
@@ -15038,17 +15220,23 @@
               <a:buChar char=""/>
             </a:pPr>
             <a:r>
-              <a:rPr lang="fr-CA" sz="1800" b="1" dirty="0">
+              <a:rPr lang="fr-CA" sz="2400" i="1" dirty="0" err="1">
                 <a:effectLst/>
                 <a:latin typeface="Calibri" panose="020F0502020204030204" pitchFamily="34" charset="0"/>
                 <a:ea typeface="Calibri" panose="020F0502020204030204" pitchFamily="34" charset="0"/>
                 <a:cs typeface="Times New Roman" panose="02020603050405020304" pitchFamily="18" charset="0"/>
               </a:rPr>
-              <a:t>Nearby</a:t>
+              <a:t>DistanceMatrix</a:t>
             </a:r>
+            <a:endParaRPr lang="fr-CA" sz="2400" i="1" dirty="0">
+              <a:effectLst/>
+              <a:latin typeface="Calibri" panose="020F0502020204030204" pitchFamily="34" charset="0"/>
+              <a:ea typeface="Calibri" panose="020F0502020204030204" pitchFamily="34" charset="0"/>
+              <a:cs typeface="Times New Roman" panose="02020603050405020304" pitchFamily="18" charset="0"/>
+            </a:endParaRPr>
           </a:p>
           <a:p>
-            <a:pPr algn="just">
+            <a:pPr>
               <a:lnSpc>
                 <a:spcPct val="107000"/>
               </a:lnSpc>
@@ -15057,17 +15245,35 @@
               </a:spcAft>
             </a:pPr>
             <a:r>
-              <a:rPr lang="fr-CA" sz="1800" b="1" dirty="0">
+              <a:rPr lang="fr-CA" sz="2400" b="1" dirty="0">
                 <a:effectLst/>
                 <a:latin typeface="Calibri" panose="020F0502020204030204" pitchFamily="34" charset="0"/>
                 <a:ea typeface="Calibri" panose="020F0502020204030204" pitchFamily="34" charset="0"/>
                 <a:cs typeface="Times New Roman" panose="02020603050405020304" pitchFamily="18" charset="0"/>
               </a:rPr>
-              <a:t>Le serveur Firestore</a:t>
+              <a:t>- Le service </a:t>
+            </a:r>
+            <a:r>
+              <a:rPr lang="fr-CA" sz="2400" i="1" dirty="0" err="1">
+                <a:effectLst/>
+                <a:latin typeface="Calibri" panose="020F0502020204030204" pitchFamily="34" charset="0"/>
+                <a:ea typeface="Calibri" panose="020F0502020204030204" pitchFamily="34" charset="0"/>
+                <a:cs typeface="Times New Roman" panose="02020603050405020304" pitchFamily="18" charset="0"/>
+              </a:rPr>
+              <a:t>Firestore</a:t>
+            </a:r>
+            <a:r>
+              <a:rPr lang="fr-CA" sz="2400" b="1" dirty="0">
+                <a:effectLst/>
+                <a:latin typeface="Calibri" panose="020F0502020204030204" pitchFamily="34" charset="0"/>
+                <a:ea typeface="Calibri" panose="020F0502020204030204" pitchFamily="34" charset="0"/>
+                <a:cs typeface="Times New Roman" panose="02020603050405020304" pitchFamily="18" charset="0"/>
+              </a:rPr>
+              <a:t> pour le stockage de données</a:t>
             </a:r>
           </a:p>
           <a:p>
-            <a:pPr algn="just">
+            <a:pPr>
               <a:lnSpc>
                 <a:spcPct val="107000"/>
               </a:lnSpc>
@@ -15076,13 +15282,31 @@
               </a:spcAft>
             </a:pPr>
             <a:r>
-              <a:rPr lang="fr-CA" sz="1800" b="1" dirty="0">
+              <a:rPr lang="fr-CA" sz="2400" b="1" dirty="0">
                 <a:effectLst/>
                 <a:latin typeface="Calibri" panose="020F0502020204030204" pitchFamily="34" charset="0"/>
                 <a:ea typeface="Calibri" panose="020F0502020204030204" pitchFamily="34" charset="0"/>
                 <a:cs typeface="Times New Roman" panose="02020603050405020304" pitchFamily="18" charset="0"/>
               </a:rPr>
-              <a:t>Android material</a:t>
+              <a:t>- Android </a:t>
+            </a:r>
+            <a:r>
+              <a:rPr lang="fr-CA" sz="2400" i="1" dirty="0" err="1">
+                <a:effectLst/>
+                <a:latin typeface="Calibri" panose="020F0502020204030204" pitchFamily="34" charset="0"/>
+                <a:ea typeface="Calibri" panose="020F0502020204030204" pitchFamily="34" charset="0"/>
+                <a:cs typeface="Times New Roman" panose="02020603050405020304" pitchFamily="18" charset="0"/>
+              </a:rPr>
+              <a:t>material</a:t>
+            </a:r>
+            <a:r>
+              <a:rPr lang="fr-CA" sz="2400" b="1" dirty="0">
+                <a:effectLst/>
+                <a:latin typeface="Calibri" panose="020F0502020204030204" pitchFamily="34" charset="0"/>
+                <a:ea typeface="Calibri" panose="020F0502020204030204" pitchFamily="34" charset="0"/>
+                <a:cs typeface="Times New Roman" panose="02020603050405020304" pitchFamily="18" charset="0"/>
+              </a:rPr>
+              <a:t> pour les champs de saisie</a:t>
             </a:r>
           </a:p>
         </p:txBody>

</xml_diff>